<commit_message>
Fixed minor formatting issues on slides 58 and 59 of data access deck.
</commit_message>
<xml_diff>
--- a/Presentations/70-534-benday-app-storage-data-access.pptx
+++ b/Presentations/70-534-benday-app-storage-data-access.pptx
@@ -12644,7 +12644,7 @@
           <a:p>
             <a:fld id="{64D44051-66E2-4006-80A2-BD85057051F8}" type="datetimeFigureOut">
               <a:rPr lang="en-US" smtClean="0"/>
-              <a:t>6/11/2017</a:t>
+              <a:t>6/12/2017</a:t>
             </a:fld>
             <a:endParaRPr lang="en-US"/>
           </a:p>
@@ -12809,7 +12809,7 @@
           <a:p>
             <a:fld id="{62207CE4-6ECC-4F8B-9D67-3C1718795CEC}" type="datetimeFigureOut">
               <a:rPr lang="en-US" smtClean="0"/>
-              <a:t>6/11/2017</a:t>
+              <a:t>6/12/2017</a:t>
             </a:fld>
             <a:endParaRPr lang="en-US"/>
           </a:p>
@@ -13253,7 +13253,7 @@
                 </a:solidFill>
               </a:rPr>
               <a:pPr/>
-              <a:t>6/11/2017</a:t>
+              <a:t>6/12/2017</a:t>
             </a:fld>
             <a:endParaRPr lang="en-US" dirty="0">
               <a:solidFill>
@@ -13840,7 +13840,7 @@
                 <a:tabLst/>
                 <a:defRPr/>
               </a:pPr>
-              <a:t>6/11/2017</a:t>
+              <a:t>6/12/2017</a:t>
             </a:fld>
             <a:endParaRPr kumimoji="0" lang="en-US" sz="1200" b="0" i="0" u="none" strike="noStrike" kern="1200" cap="none" spc="0" normalizeH="0" baseline="0" noProof="0" dirty="0">
               <a:ln>
@@ -14107,7 +14107,7 @@
                 </a:solidFill>
               </a:rPr>
               <a:pPr/>
-              <a:t>6/11/2017</a:t>
+              <a:t>6/12/2017</a:t>
             </a:fld>
             <a:endParaRPr lang="en-US" dirty="0">
               <a:solidFill>
@@ -14286,7 +14286,7 @@
                 </a:solidFill>
               </a:rPr>
               <a:pPr/>
-              <a:t>6/11/2017</a:t>
+              <a:t>6/12/2017</a:t>
             </a:fld>
             <a:endParaRPr lang="en-US" dirty="0">
               <a:solidFill>
@@ -14730,7 +14730,7 @@
           <a:p>
             <a:fld id="{C764DE79-268F-4C1A-8933-263129D2AF90}" type="datetimeFigureOut">
               <a:rPr lang="en-US" dirty="0"/>
-              <a:t>6/11/2017</a:t>
+              <a:t>6/12/2017</a:t>
             </a:fld>
             <a:endParaRPr lang="en-US" dirty="0"/>
           </a:p>
@@ -14966,7 +14966,7 @@
           <a:p>
             <a:fld id="{C764DE79-268F-4C1A-8933-263129D2AF90}" type="datetimeFigureOut">
               <a:rPr lang="en-US" dirty="0"/>
-              <a:t>6/11/2017</a:t>
+              <a:t>6/12/2017</a:t>
             </a:fld>
             <a:endParaRPr lang="en-US" dirty="0"/>
           </a:p>
@@ -15328,7 +15328,7 @@
           <a:p>
             <a:fld id="{C764DE79-268F-4C1A-8933-263129D2AF90}" type="datetimeFigureOut">
               <a:rPr lang="en-US" dirty="0"/>
-              <a:t>6/11/2017</a:t>
+              <a:t>6/12/2017</a:t>
             </a:fld>
             <a:endParaRPr lang="en-US" dirty="0"/>
           </a:p>
@@ -15451,7 +15451,7 @@
           <a:p>
             <a:fld id="{C764DE79-268F-4C1A-8933-263129D2AF90}" type="datetimeFigureOut">
               <a:rPr lang="en-US" dirty="0"/>
-              <a:t>6/11/2017</a:t>
+              <a:t>6/12/2017</a:t>
             </a:fld>
             <a:endParaRPr lang="en-US" dirty="0"/>
           </a:p>
@@ -15541,7 +15541,7 @@
           <a:p>
             <a:fld id="{C764DE79-268F-4C1A-8933-263129D2AF90}" type="datetimeFigureOut">
               <a:rPr lang="en-US" dirty="0"/>
-              <a:t>6/11/2017</a:t>
+              <a:t>6/12/2017</a:t>
             </a:fld>
             <a:endParaRPr lang="en-US" dirty="0"/>
           </a:p>
@@ -15813,7 +15813,7 @@
           <a:p>
             <a:fld id="{C764DE79-268F-4C1A-8933-263129D2AF90}" type="datetimeFigureOut">
               <a:rPr lang="en-US" dirty="0"/>
-              <a:t>6/11/2017</a:t>
+              <a:t>6/12/2017</a:t>
             </a:fld>
             <a:endParaRPr lang="en-US" dirty="0"/>
           </a:p>
@@ -16065,7 +16065,7 @@
           <a:p>
             <a:fld id="{C764DE79-268F-4C1A-8933-263129D2AF90}" type="datetimeFigureOut">
               <a:rPr lang="en-US" dirty="0"/>
-              <a:t>6/11/2017</a:t>
+              <a:t>6/12/2017</a:t>
             </a:fld>
             <a:endParaRPr lang="en-US" dirty="0"/>
           </a:p>
@@ -16230,7 +16230,7 @@
           <a:p>
             <a:fld id="{C764DE79-268F-4C1A-8933-263129D2AF90}" type="datetimeFigureOut">
               <a:rPr lang="en-US" dirty="0"/>
-              <a:t>6/11/2017</a:t>
+              <a:t>6/12/2017</a:t>
             </a:fld>
             <a:endParaRPr lang="en-US" dirty="0"/>
           </a:p>
@@ -16405,7 +16405,7 @@
           <a:p>
             <a:fld id="{C764DE79-268F-4C1A-8933-263129D2AF90}" type="datetimeFigureOut">
               <a:rPr lang="en-US" dirty="0"/>
-              <a:t>6/11/2017</a:t>
+              <a:t>6/12/2017</a:t>
             </a:fld>
             <a:endParaRPr lang="en-US" dirty="0"/>
           </a:p>
@@ -27961,7 +27961,7 @@
           <a:p>
             <a:fld id="{C764DE79-268F-4C1A-8933-263129D2AF90}" type="datetimeFigureOut">
               <a:rPr lang="en-US" dirty="0"/>
-              <a:t>6/11/2017</a:t>
+              <a:t>6/12/2017</a:t>
             </a:fld>
             <a:endParaRPr lang="en-US" dirty="0"/>
           </a:p>
@@ -28163,7 +28163,7 @@
           <a:p>
             <a:fld id="{C764DE79-268F-4C1A-8933-263129D2AF90}" type="datetimeFigureOut">
               <a:rPr lang="en-US" dirty="0"/>
-              <a:t>6/11/2017</a:t>
+              <a:t>6/12/2017</a:t>
             </a:fld>
             <a:endParaRPr lang="en-US" dirty="0"/>
           </a:p>
@@ -28410,7 +28410,7 @@
           <a:p>
             <a:fld id="{C764DE79-268F-4C1A-8933-263129D2AF90}" type="datetimeFigureOut">
               <a:rPr lang="en-US" dirty="0"/>
-              <a:t>6/11/2017</a:t>
+              <a:t>6/12/2017</a:t>
             </a:fld>
             <a:endParaRPr lang="en-US" dirty="0"/>
           </a:p>
@@ -28783,7 +28783,7 @@
           <a:p>
             <a:fld id="{C764DE79-268F-4C1A-8933-263129D2AF90}" type="datetimeFigureOut">
               <a:rPr lang="en-US" dirty="0"/>
-              <a:t>6/11/2017</a:t>
+              <a:t>6/12/2017</a:t>
             </a:fld>
             <a:endParaRPr lang="en-US" dirty="0"/>
           </a:p>
@@ -44724,31 +44724,6 @@
           </a:p>
         </p:txBody>
       </p:sp>
-      <p:sp>
-        <p:nvSpPr>
-          <p:cNvPr id="3" name="Content Placeholder 2">
-            <a:extLst>
-              <a:ext uri="{FF2B5EF4-FFF2-40B4-BE49-F238E27FC236}">
-                <a16:creationId xmlns:a16="http://schemas.microsoft.com/office/drawing/2014/main" id="{8831BD7E-A02D-44CD-82C0-9F1540C96F08}"/>
-              </a:ext>
-            </a:extLst>
-          </p:cNvPr>
-          <p:cNvSpPr>
-            <a:spLocks noGrp="1"/>
-          </p:cNvSpPr>
-          <p:nvPr>
-            <p:ph idx="10"/>
-          </p:nvPr>
-        </p:nvSpPr>
-        <p:spPr/>
-        <p:txBody>
-          <a:bodyPr/>
-          <a:lstStyle/>
-          <a:p>
-            <a:endParaRPr lang="en-US" dirty="0"/>
-          </a:p>
-        </p:txBody>
-      </p:sp>
     </p:spTree>
     <p:extLst>
       <p:ext uri="{BB962C8B-B14F-4D97-AF65-F5344CB8AC3E}">
@@ -45250,31 +45225,6 @@
           </a:p>
           <a:p>
             <a:endParaRPr lang="en-US" dirty="0"/>
-          </a:p>
-        </p:txBody>
-      </p:sp>
-      <p:sp>
-        <p:nvSpPr>
-          <p:cNvPr id="3" name="Content Placeholder 2">
-            <a:extLst>
-              <a:ext uri="{FF2B5EF4-FFF2-40B4-BE49-F238E27FC236}">
-                <a16:creationId xmlns:a16="http://schemas.microsoft.com/office/drawing/2014/main" id="{C5C2318F-D26B-4DCD-B9D5-899CB7BBB543}"/>
-              </a:ext>
-            </a:extLst>
-          </p:cNvPr>
-          <p:cNvSpPr>
-            <a:spLocks noGrp="1"/>
-          </p:cNvSpPr>
-          <p:nvPr>
-            <p:ph idx="10"/>
-          </p:nvPr>
-        </p:nvSpPr>
-        <p:spPr/>
-        <p:txBody>
-          <a:bodyPr/>
-          <a:lstStyle/>
-          <a:p>
-            <a:endParaRPr lang="en-US"/>
           </a:p>
         </p:txBody>
       </p:sp>

</xml_diff>